<commit_message>
chapter update to 37
</commit_message>
<xml_diff>
--- a/MySQL实战/17如何正确地显示随机消息？.pptx
+++ b/MySQL实战/17如何正确地显示随机消息？.pptx
@@ -200,7 +200,7 @@
           <a:p>
             <a:fld id="{A900F2CD-AD8F-46FC-AAAB-A0D218D6826F}" type="datetimeFigureOut">
               <a:rPr lang="zh-CN" altLang="en-US" smtClean="0"/>
-              <a:t>2019/5/21</a:t>
+              <a:t>2019/6/11</a:t>
             </a:fld>
             <a:endParaRPr lang="zh-CN" altLang="en-US"/>
           </a:p>
@@ -654,7 +654,7 @@
           <a:p>
             <a:fld id="{E396512D-F96B-4538-B91A-F7EB57A489A0}" type="datetimeFigureOut">
               <a:rPr lang="zh-CN" altLang="en-US" smtClean="0"/>
-              <a:t>2019/5/21</a:t>
+              <a:t>2019/6/11</a:t>
             </a:fld>
             <a:endParaRPr lang="zh-CN" altLang="en-US"/>
           </a:p>
@@ -929,7 +929,7 @@
           <a:p>
             <a:fld id="{E396512D-F96B-4538-B91A-F7EB57A489A0}" type="datetimeFigureOut">
               <a:rPr lang="zh-CN" altLang="en-US" smtClean="0"/>
-              <a:t>2019/5/21</a:t>
+              <a:t>2019/6/11</a:t>
             </a:fld>
             <a:endParaRPr lang="zh-CN" altLang="en-US"/>
           </a:p>
@@ -1123,7 +1123,7 @@
           <a:p>
             <a:fld id="{E396512D-F96B-4538-B91A-F7EB57A489A0}" type="datetimeFigureOut">
               <a:rPr lang="zh-CN" altLang="en-US" smtClean="0"/>
-              <a:t>2019/5/21</a:t>
+              <a:t>2019/6/11</a:t>
             </a:fld>
             <a:endParaRPr lang="zh-CN" altLang="en-US"/>
           </a:p>
@@ -1396,7 +1396,7 @@
           <a:p>
             <a:fld id="{E396512D-F96B-4538-B91A-F7EB57A489A0}" type="datetimeFigureOut">
               <a:rPr lang="zh-CN" altLang="en-US" smtClean="0"/>
-              <a:t>2019/5/21</a:t>
+              <a:t>2019/6/11</a:t>
             </a:fld>
             <a:endParaRPr lang="zh-CN" altLang="en-US"/>
           </a:p>
@@ -1737,7 +1737,7 @@
           <a:p>
             <a:fld id="{E396512D-F96B-4538-B91A-F7EB57A489A0}" type="datetimeFigureOut">
               <a:rPr lang="zh-CN" altLang="en-US" smtClean="0"/>
-              <a:t>2019/5/21</a:t>
+              <a:t>2019/6/11</a:t>
             </a:fld>
             <a:endParaRPr lang="zh-CN" altLang="en-US"/>
           </a:p>
@@ -2360,7 +2360,7 @@
           <a:p>
             <a:fld id="{E396512D-F96B-4538-B91A-F7EB57A489A0}" type="datetimeFigureOut">
               <a:rPr lang="zh-CN" altLang="en-US" smtClean="0"/>
-              <a:t>2019/5/21</a:t>
+              <a:t>2019/6/11</a:t>
             </a:fld>
             <a:endParaRPr lang="zh-CN" altLang="en-US"/>
           </a:p>
@@ -3220,7 +3220,7 @@
           <a:p>
             <a:fld id="{E396512D-F96B-4538-B91A-F7EB57A489A0}" type="datetimeFigureOut">
               <a:rPr lang="zh-CN" altLang="en-US" smtClean="0"/>
-              <a:t>2019/5/21</a:t>
+              <a:t>2019/6/11</a:t>
             </a:fld>
             <a:endParaRPr lang="zh-CN" altLang="en-US"/>
           </a:p>
@@ -3390,7 +3390,7 @@
           <a:p>
             <a:fld id="{E396512D-F96B-4538-B91A-F7EB57A489A0}" type="datetimeFigureOut">
               <a:rPr lang="zh-CN" altLang="en-US" smtClean="0"/>
-              <a:t>2019/5/21</a:t>
+              <a:t>2019/6/11</a:t>
             </a:fld>
             <a:endParaRPr lang="zh-CN" altLang="en-US"/>
           </a:p>
@@ -3570,7 +3570,7 @@
           <a:p>
             <a:fld id="{E396512D-F96B-4538-B91A-F7EB57A489A0}" type="datetimeFigureOut">
               <a:rPr lang="zh-CN" altLang="en-US" smtClean="0"/>
-              <a:t>2019/5/21</a:t>
+              <a:t>2019/6/11</a:t>
             </a:fld>
             <a:endParaRPr lang="zh-CN" altLang="en-US"/>
           </a:p>
@@ -3740,7 +3740,7 @@
           <a:p>
             <a:fld id="{E396512D-F96B-4538-B91A-F7EB57A489A0}" type="datetimeFigureOut">
               <a:rPr lang="zh-CN" altLang="en-US" smtClean="0"/>
-              <a:t>2019/5/21</a:t>
+              <a:t>2019/6/11</a:t>
             </a:fld>
             <a:endParaRPr lang="zh-CN" altLang="en-US"/>
           </a:p>
@@ -3987,7 +3987,7 @@
           <a:p>
             <a:fld id="{E396512D-F96B-4538-B91A-F7EB57A489A0}" type="datetimeFigureOut">
               <a:rPr lang="zh-CN" altLang="en-US" smtClean="0"/>
-              <a:t>2019/5/21</a:t>
+              <a:t>2019/6/11</a:t>
             </a:fld>
             <a:endParaRPr lang="zh-CN" altLang="en-US"/>
           </a:p>
@@ -4279,7 +4279,7 @@
           <a:p>
             <a:fld id="{E396512D-F96B-4538-B91A-F7EB57A489A0}" type="datetimeFigureOut">
               <a:rPr lang="zh-CN" altLang="en-US" smtClean="0"/>
-              <a:t>2019/5/21</a:t>
+              <a:t>2019/6/11</a:t>
             </a:fld>
             <a:endParaRPr lang="zh-CN" altLang="en-US"/>
           </a:p>
@@ -4723,7 +4723,7 @@
           <a:p>
             <a:fld id="{E396512D-F96B-4538-B91A-F7EB57A489A0}" type="datetimeFigureOut">
               <a:rPr lang="zh-CN" altLang="en-US" smtClean="0"/>
-              <a:t>2019/5/21</a:t>
+              <a:t>2019/6/11</a:t>
             </a:fld>
             <a:endParaRPr lang="zh-CN" altLang="en-US"/>
           </a:p>
@@ -4841,7 +4841,7 @@
           <a:p>
             <a:fld id="{E396512D-F96B-4538-B91A-F7EB57A489A0}" type="datetimeFigureOut">
               <a:rPr lang="zh-CN" altLang="en-US" smtClean="0"/>
-              <a:t>2019/5/21</a:t>
+              <a:t>2019/6/11</a:t>
             </a:fld>
             <a:endParaRPr lang="zh-CN" altLang="en-US"/>
           </a:p>
@@ -4936,7 +4936,7 @@
           <a:p>
             <a:fld id="{E396512D-F96B-4538-B91A-F7EB57A489A0}" type="datetimeFigureOut">
               <a:rPr lang="zh-CN" altLang="en-US" smtClean="0"/>
-              <a:t>2019/5/21</a:t>
+              <a:t>2019/6/11</a:t>
             </a:fld>
             <a:endParaRPr lang="zh-CN" altLang="en-US"/>
           </a:p>
@@ -5215,7 +5215,7 @@
           <a:p>
             <a:fld id="{E396512D-F96B-4538-B91A-F7EB57A489A0}" type="datetimeFigureOut">
               <a:rPr lang="zh-CN" altLang="en-US" smtClean="0"/>
-              <a:t>2019/5/21</a:t>
+              <a:t>2019/6/11</a:t>
             </a:fld>
             <a:endParaRPr lang="zh-CN" altLang="en-US"/>
           </a:p>
@@ -5490,7 +5490,7 @@
           <a:p>
             <a:fld id="{E396512D-F96B-4538-B91A-F7EB57A489A0}" type="datetimeFigureOut">
               <a:rPr lang="zh-CN" altLang="en-US" smtClean="0"/>
-              <a:t>2019/5/21</a:t>
+              <a:t>2019/6/11</a:t>
             </a:fld>
             <a:endParaRPr lang="zh-CN" altLang="en-US"/>
           </a:p>
@@ -5919,7 +5919,7 @@
           <a:p>
             <a:fld id="{E396512D-F96B-4538-B91A-F7EB57A489A0}" type="datetimeFigureOut">
               <a:rPr lang="zh-CN" altLang="en-US" smtClean="0"/>
-              <a:t>2019/5/21</a:t>
+              <a:t>2019/6/11</a:t>
             </a:fld>
             <a:endParaRPr lang="zh-CN" altLang="en-US"/>
           </a:p>
@@ -6481,10 +6481,6 @@
               </a:rPr>
               <a:t>如何正确地显示随机消息？</a:t>
             </a:r>
-            <a:endParaRPr lang="zh-CN" altLang="en-US" sz="3200" b="1" dirty="0">
-              <a:latin typeface="微软雅黑" panose="020B0503020204020204" pitchFamily="34" charset="-122"/>
-              <a:ea typeface="微软雅黑" panose="020B0503020204020204" pitchFamily="34" charset="-122"/>
-            </a:endParaRPr>
           </a:p>
         </p:txBody>
       </p:sp>
@@ -6949,10 +6945,6 @@
               </a:rPr>
               <a:t>如何正确地显示随机消息？</a:t>
             </a:r>
-            <a:endParaRPr lang="zh-CN" altLang="en-US" sz="3200" b="1" dirty="0">
-              <a:latin typeface="微软雅黑" panose="020B0503020204020204" pitchFamily="34" charset="-122"/>
-              <a:ea typeface="微软雅黑" panose="020B0503020204020204" pitchFamily="34" charset="-122"/>
-            </a:endParaRPr>
           </a:p>
         </p:txBody>
       </p:sp>
@@ -8485,10 +8477,17 @@
                 <a:latin typeface="微软雅黑" panose="020B0503020204020204" pitchFamily="34" charset="-122"/>
                 <a:ea typeface="微软雅黑" panose="020B0503020204020204" pitchFamily="34" charset="-122"/>
               </a:rPr>
-              <a:t>值和位置信息（数组下标）存放金</a:t>
-            </a:r>
-            <a:r>
-              <a:rPr lang="en-US" altLang="zh-CN" sz="1400" dirty="0" err="1" smtClean="0">
+              <a:t>值和位置信息（数组下标</a:t>
+            </a:r>
+            <a:r>
+              <a:rPr lang="zh-CN" altLang="en-US" sz="1400" smtClean="0">
+                <a:latin typeface="微软雅黑" panose="020B0503020204020204" pitchFamily="34" charset="-122"/>
+                <a:ea typeface="微软雅黑" panose="020B0503020204020204" pitchFamily="34" charset="-122"/>
+              </a:rPr>
+              <a:t>）存放进</a:t>
+            </a:r>
+            <a:r>
+              <a:rPr lang="en-US" altLang="zh-CN" sz="1400" smtClean="0">
                 <a:latin typeface="微软雅黑" panose="020B0503020204020204" pitchFamily="34" charset="-122"/>
                 <a:ea typeface="微软雅黑" panose="020B0503020204020204" pitchFamily="34" charset="-122"/>
               </a:rPr>
@@ -9777,10 +9776,6 @@
               </a:rPr>
               <a:t>如何正确地显示随机消息？</a:t>
             </a:r>
-            <a:endParaRPr lang="zh-CN" altLang="en-US" sz="3200" b="1" dirty="0">
-              <a:latin typeface="微软雅黑" panose="020B0503020204020204" pitchFamily="34" charset="-122"/>
-              <a:ea typeface="微软雅黑" panose="020B0503020204020204" pitchFamily="34" charset="-122"/>
-            </a:endParaRPr>
           </a:p>
         </p:txBody>
       </p:sp>
@@ -10604,14 +10599,7 @@
                 <a:latin typeface="微软雅黑" panose="020B0503020204020204" pitchFamily="34" charset="-122"/>
                 <a:ea typeface="微软雅黑" panose="020B0503020204020204" pitchFamily="34" charset="-122"/>
               </a:rPr>
-              <a:t>表名</a:t>
-            </a:r>
-            <a:r>
-              <a:rPr lang="zh-CN" altLang="en-US" sz="1400" dirty="0">
-                <a:latin typeface="微软雅黑" panose="020B0503020204020204" pitchFamily="34" charset="-122"/>
-                <a:ea typeface="微软雅黑" panose="020B0503020204020204" pitchFamily="34" charset="-122"/>
-              </a:rPr>
-              <a:t>使用</a:t>
+              <a:t>表明使用</a:t>
             </a:r>
             <a:r>
               <a:rPr lang="zh-CN" altLang="en-US" sz="1400" dirty="0" smtClean="0">
@@ -10677,7 +10665,14 @@
                 <a:latin typeface="微软雅黑" panose="020B0503020204020204" pitchFamily="34" charset="-122"/>
                 <a:ea typeface="微软雅黑" panose="020B0503020204020204" pitchFamily="34" charset="-122"/>
               </a:rPr>
-              <a:t>优先队列排序算法不需要使用临时文件，只需要在构建</a:t>
+              <a:t>优先队列排序算法不需要使用临时文件，只需</a:t>
+            </a:r>
+            <a:r>
+              <a:rPr lang="zh-CN" altLang="en-US" sz="1400" dirty="0" smtClean="0">
+                <a:latin typeface="微软雅黑" panose="020B0503020204020204" pitchFamily="34" charset="-122"/>
+                <a:ea typeface="微软雅黑" panose="020B0503020204020204" pitchFamily="34" charset="-122"/>
+              </a:rPr>
+              <a:t>要构建</a:t>
             </a:r>
             <a:r>
               <a:rPr lang="en-US" altLang="zh-CN" sz="1400" dirty="0" smtClean="0">
@@ -10873,10 +10868,6 @@
               </a:rPr>
               <a:t>如何正确地显示随机消息？</a:t>
             </a:r>
-            <a:endParaRPr lang="zh-CN" altLang="en-US" sz="3200" b="1" dirty="0">
-              <a:latin typeface="微软雅黑" panose="020B0503020204020204" pitchFamily="34" charset="-122"/>
-              <a:ea typeface="微软雅黑" panose="020B0503020204020204" pitchFamily="34" charset="-122"/>
-            </a:endParaRPr>
           </a:p>
         </p:txBody>
       </p:sp>
@@ -11352,13 +11343,6 @@
               </a:rPr>
               <a:t>40000</a:t>
             </a:r>
-            <a:endParaRPr lang="en-US" altLang="zh-CN" sz="1600" dirty="0" smtClean="0">
-              <a:solidFill>
-                <a:srgbClr val="FFFF00"/>
-              </a:solidFill>
-              <a:latin typeface="微软雅黑" panose="020B0503020204020204" pitchFamily="34" charset="-122"/>
-              <a:ea typeface="微软雅黑" panose="020B0503020204020204" pitchFamily="34" charset="-122"/>
-            </a:endParaRPr>
           </a:p>
         </p:txBody>
       </p:sp>
@@ -11560,17 +11544,7 @@
                 <a:latin typeface="微软雅黑" panose="020B0503020204020204" pitchFamily="34" charset="-122"/>
                 <a:ea typeface="微软雅黑" panose="020B0503020204020204" pitchFamily="34" charset="-122"/>
               </a:rPr>
-              <a:t>limit Y</a:t>
-            </a:r>
-            <a:r>
-              <a:rPr lang="en-US" altLang="zh-CN" sz="1600" dirty="0" smtClean="0">
-                <a:solidFill>
-                  <a:srgbClr val="92D050"/>
-                </a:solidFill>
-                <a:latin typeface="微软雅黑" panose="020B0503020204020204" pitchFamily="34" charset="-122"/>
-                <a:ea typeface="微软雅黑" panose="020B0503020204020204" pitchFamily="34" charset="-122"/>
-              </a:rPr>
-              <a:t>,1</a:t>
+              <a:t>limit Y,1</a:t>
             </a:r>
             <a:r>
               <a:rPr lang="zh-CN" altLang="en-US" sz="1600" dirty="0">

</xml_diff>